<commit_message>
Backlog ajustado e StoryBoard finalizado
</commit_message>
<xml_diff>
--- a/StoryBoard - TotemHub.pptx
+++ b/StoryBoard - TotemHub.pptx
@@ -5,7 +5,7 @@
     <p:sldMasterId id="2147483677" r:id="rId1"/>
   </p:sldMasterIdLst>
   <p:sldIdLst>
-    <p:sldId id="256" r:id="rId2"/>
+    <p:sldId id="258" r:id="rId2"/>
   </p:sldIdLst>
   <p:sldSz cx="12192000" cy="6858000"/>
   <p:notesSz cx="6858000" cy="9144000"/>
@@ -303,7 +303,7 @@
           <a:p>
             <a:fld id="{9580DF9F-C5AB-4FDA-B2AC-9889A24C1F6D}" type="datetimeFigureOut">
               <a:rPr lang="pt-BR" smtClean="0"/>
-              <a:t>26/08/2021</a:t>
+              <a:t>27/08/2021</a:t>
             </a:fld>
             <a:endParaRPr lang="pt-BR" dirty="0"/>
           </a:p>
@@ -738,7 +738,7 @@
           <a:p>
             <a:fld id="{9580DF9F-C5AB-4FDA-B2AC-9889A24C1F6D}" type="datetimeFigureOut">
               <a:rPr lang="pt-BR" smtClean="0"/>
-              <a:t>26/08/2021</a:t>
+              <a:t>27/08/2021</a:t>
             </a:fld>
             <a:endParaRPr lang="pt-BR" dirty="0"/>
           </a:p>
@@ -988,7 +988,7 @@
           <a:p>
             <a:fld id="{9580DF9F-C5AB-4FDA-B2AC-9889A24C1F6D}" type="datetimeFigureOut">
               <a:rPr lang="pt-BR" smtClean="0"/>
-              <a:t>26/08/2021</a:t>
+              <a:t>27/08/2021</a:t>
             </a:fld>
             <a:endParaRPr lang="pt-BR" dirty="0"/>
           </a:p>
@@ -1296,7 +1296,7 @@
           <a:p>
             <a:fld id="{9580DF9F-C5AB-4FDA-B2AC-9889A24C1F6D}" type="datetimeFigureOut">
               <a:rPr lang="pt-BR" smtClean="0"/>
-              <a:t>26/08/2021</a:t>
+              <a:t>27/08/2021</a:t>
             </a:fld>
             <a:endParaRPr lang="pt-BR" dirty="0"/>
           </a:p>
@@ -1614,7 +1614,7 @@
           <a:p>
             <a:fld id="{9580DF9F-C5AB-4FDA-B2AC-9889A24C1F6D}" type="datetimeFigureOut">
               <a:rPr lang="pt-BR" smtClean="0"/>
-              <a:t>26/08/2021</a:t>
+              <a:t>27/08/2021</a:t>
             </a:fld>
             <a:endParaRPr lang="pt-BR" dirty="0"/>
           </a:p>
@@ -1916,7 +1916,7 @@
           <a:p>
             <a:fld id="{9580DF9F-C5AB-4FDA-B2AC-9889A24C1F6D}" type="datetimeFigureOut">
               <a:rPr lang="pt-BR" smtClean="0"/>
-              <a:t>26/08/2021</a:t>
+              <a:t>27/08/2021</a:t>
             </a:fld>
             <a:endParaRPr lang="pt-BR" dirty="0"/>
           </a:p>
@@ -2283,7 +2283,7 @@
           <a:p>
             <a:fld id="{9580DF9F-C5AB-4FDA-B2AC-9889A24C1F6D}" type="datetimeFigureOut">
               <a:rPr lang="pt-BR" smtClean="0"/>
-              <a:t>26/08/2021</a:t>
+              <a:t>27/08/2021</a:t>
             </a:fld>
             <a:endParaRPr lang="pt-BR" dirty="0"/>
           </a:p>
@@ -2457,7 +2457,7 @@
           <a:p>
             <a:fld id="{9580DF9F-C5AB-4FDA-B2AC-9889A24C1F6D}" type="datetimeFigureOut">
               <a:rPr lang="pt-BR" smtClean="0"/>
-              <a:t>26/08/2021</a:t>
+              <a:t>27/08/2021</a:t>
             </a:fld>
             <a:endParaRPr lang="pt-BR" dirty="0"/>
           </a:p>
@@ -2637,7 +2637,7 @@
           <a:p>
             <a:fld id="{9580DF9F-C5AB-4FDA-B2AC-9889A24C1F6D}" type="datetimeFigureOut">
               <a:rPr lang="pt-BR" smtClean="0"/>
-              <a:t>26/08/2021</a:t>
+              <a:t>27/08/2021</a:t>
             </a:fld>
             <a:endParaRPr lang="pt-BR" dirty="0"/>
           </a:p>
@@ -2807,7 +2807,7 @@
           <a:p>
             <a:fld id="{9580DF9F-C5AB-4FDA-B2AC-9889A24C1F6D}" type="datetimeFigureOut">
               <a:rPr lang="pt-BR" smtClean="0"/>
-              <a:t>26/08/2021</a:t>
+              <a:t>27/08/2021</a:t>
             </a:fld>
             <a:endParaRPr lang="pt-BR" dirty="0"/>
           </a:p>
@@ -3057,7 +3057,7 @@
           <a:p>
             <a:fld id="{9580DF9F-C5AB-4FDA-B2AC-9889A24C1F6D}" type="datetimeFigureOut">
               <a:rPr lang="pt-BR" smtClean="0"/>
-              <a:t>26/08/2021</a:t>
+              <a:t>27/08/2021</a:t>
             </a:fld>
             <a:endParaRPr lang="pt-BR" dirty="0"/>
           </a:p>
@@ -3293,7 +3293,7 @@
           <a:p>
             <a:fld id="{9580DF9F-C5AB-4FDA-B2AC-9889A24C1F6D}" type="datetimeFigureOut">
               <a:rPr lang="pt-BR" smtClean="0"/>
-              <a:t>26/08/2021</a:t>
+              <a:t>27/08/2021</a:t>
             </a:fld>
             <a:endParaRPr lang="pt-BR" dirty="0"/>
           </a:p>
@@ -3675,7 +3675,7 @@
           <a:p>
             <a:fld id="{9580DF9F-C5AB-4FDA-B2AC-9889A24C1F6D}" type="datetimeFigureOut">
               <a:rPr lang="pt-BR" smtClean="0"/>
-              <a:t>26/08/2021</a:t>
+              <a:t>27/08/2021</a:t>
             </a:fld>
             <a:endParaRPr lang="pt-BR" dirty="0"/>
           </a:p>
@@ -3793,7 +3793,7 @@
           <a:p>
             <a:fld id="{9580DF9F-C5AB-4FDA-B2AC-9889A24C1F6D}" type="datetimeFigureOut">
               <a:rPr lang="pt-BR" smtClean="0"/>
-              <a:t>26/08/2021</a:t>
+              <a:t>27/08/2021</a:t>
             </a:fld>
             <a:endParaRPr lang="pt-BR" dirty="0"/>
           </a:p>
@@ -3888,7 +3888,7 @@
           <a:p>
             <a:fld id="{9580DF9F-C5AB-4FDA-B2AC-9889A24C1F6D}" type="datetimeFigureOut">
               <a:rPr lang="pt-BR" smtClean="0"/>
-              <a:t>26/08/2021</a:t>
+              <a:t>27/08/2021</a:t>
             </a:fld>
             <a:endParaRPr lang="pt-BR" dirty="0"/>
           </a:p>
@@ -4143,7 +4143,7 @@
           <a:p>
             <a:fld id="{9580DF9F-C5AB-4FDA-B2AC-9889A24C1F6D}" type="datetimeFigureOut">
               <a:rPr lang="pt-BR" smtClean="0"/>
-              <a:t>26/08/2021</a:t>
+              <a:t>27/08/2021</a:t>
             </a:fld>
             <a:endParaRPr lang="pt-BR" dirty="0"/>
           </a:p>
@@ -4425,7 +4425,7 @@
           <a:p>
             <a:fld id="{9580DF9F-C5AB-4FDA-B2AC-9889A24C1F6D}" type="datetimeFigureOut">
               <a:rPr lang="pt-BR" smtClean="0"/>
-              <a:t>26/08/2021</a:t>
+              <a:t>27/08/2021</a:t>
             </a:fld>
             <a:endParaRPr lang="pt-BR" dirty="0"/>
           </a:p>
@@ -4831,7 +4831,7 @@
           <a:p>
             <a:fld id="{9580DF9F-C5AB-4FDA-B2AC-9889A24C1F6D}" type="datetimeFigureOut">
               <a:rPr lang="pt-BR" smtClean="0"/>
-              <a:t>26/08/2021</a:t>
+              <a:t>27/08/2021</a:t>
             </a:fld>
             <a:endParaRPr lang="pt-BR" dirty="0"/>
           </a:p>
@@ -5352,14 +5352,6 @@
 <file path=ppt/slides/slide1.xml><?xml version="1.0" encoding="utf-8"?>
 <p:sld xmlns:a="http://schemas.openxmlformats.org/drawingml/2006/main" xmlns:r="http://schemas.openxmlformats.org/officeDocument/2006/relationships" xmlns:p="http://schemas.openxmlformats.org/presentationml/2006/main">
   <p:cSld>
-    <p:bg>
-      <p:bgPr>
-        <a:solidFill>
-          <a:schemeClr val="bg1"/>
-        </a:solidFill>
-        <a:effectLst/>
-      </p:bgPr>
-    </p:bg>
     <p:spTree>
       <p:nvGrpSpPr>
         <p:cNvPr id="1" name=""/>
@@ -5374,214 +5366,6 @@
           <a:chExt cx="0" cy="0"/>
         </a:xfrm>
       </p:grpSpPr>
-      <p:pic>
-        <p:nvPicPr>
-          <p:cNvPr id="11" name="Picture 10">
-            <a:extLst>
-              <a:ext uri="{FF2B5EF4-FFF2-40B4-BE49-F238E27FC236}">
-                <a16:creationId xmlns:a16="http://schemas.microsoft.com/office/drawing/2014/main" id="{87EEE119-268F-458B-8246-A06A9EDB0D4A}"/>
-              </a:ext>
-            </a:extLst>
-          </p:cNvPr>
-          <p:cNvPicPr>
-            <a:picLocks noChangeAspect="1"/>
-          </p:cNvPicPr>
-          <p:nvPr/>
-        </p:nvPicPr>
-        <p:blipFill>
-          <a:blip r:embed="rId2"/>
-          <a:stretch>
-            <a:fillRect/>
-          </a:stretch>
-        </p:blipFill>
-        <p:spPr>
-          <a:xfrm>
-            <a:off x="8957420" y="497945"/>
-            <a:ext cx="3106961" cy="2801609"/>
-          </a:xfrm>
-          <a:prstGeom prst="rect">
-            <a:avLst/>
-          </a:prstGeom>
-        </p:spPr>
-      </p:pic>
-      <p:pic>
-        <p:nvPicPr>
-          <p:cNvPr id="14" name="Picture 13">
-            <a:extLst>
-              <a:ext uri="{FF2B5EF4-FFF2-40B4-BE49-F238E27FC236}">
-                <a16:creationId xmlns:a16="http://schemas.microsoft.com/office/drawing/2014/main" id="{A177A332-E76D-46FD-A171-188041DFCA08}"/>
-              </a:ext>
-            </a:extLst>
-          </p:cNvPr>
-          <p:cNvPicPr>
-            <a:picLocks noChangeAspect="1"/>
-          </p:cNvPicPr>
-          <p:nvPr/>
-        </p:nvPicPr>
-        <p:blipFill>
-          <a:blip r:embed="rId3"/>
-          <a:stretch>
-            <a:fillRect/>
-          </a:stretch>
-        </p:blipFill>
-        <p:spPr>
-          <a:xfrm>
-            <a:off x="8957420" y="3837491"/>
-            <a:ext cx="3041321" cy="2801610"/>
-          </a:xfrm>
-          <a:prstGeom prst="rect">
-            <a:avLst/>
-          </a:prstGeom>
-        </p:spPr>
-      </p:pic>
-      <p:pic>
-        <p:nvPicPr>
-          <p:cNvPr id="9" name="Picture 8">
-            <a:extLst>
-              <a:ext uri="{FF2B5EF4-FFF2-40B4-BE49-F238E27FC236}">
-                <a16:creationId xmlns:a16="http://schemas.microsoft.com/office/drawing/2014/main" id="{138CFC1F-AEE9-4C23-84B9-817BDD588DF7}"/>
-              </a:ext>
-            </a:extLst>
-          </p:cNvPr>
-          <p:cNvPicPr>
-            <a:picLocks noChangeAspect="1"/>
-          </p:cNvPicPr>
-          <p:nvPr/>
-        </p:nvPicPr>
-        <p:blipFill>
-          <a:blip r:embed="rId4"/>
-          <a:stretch>
-            <a:fillRect/>
-          </a:stretch>
-        </p:blipFill>
-        <p:spPr>
-          <a:xfrm>
-            <a:off x="4617853" y="2645844"/>
-            <a:ext cx="3100142" cy="2801610"/>
-          </a:xfrm>
-          <a:prstGeom prst="rect">
-            <a:avLst/>
-          </a:prstGeom>
-        </p:spPr>
-      </p:pic>
-      <p:pic>
-        <p:nvPicPr>
-          <p:cNvPr id="5" name="Picture 4">
-            <a:extLst>
-              <a:ext uri="{FF2B5EF4-FFF2-40B4-BE49-F238E27FC236}">
-                <a16:creationId xmlns:a16="http://schemas.microsoft.com/office/drawing/2014/main" id="{C07A4DA2-97CC-451C-8612-C24A6FA11AD7}"/>
-              </a:ext>
-            </a:extLst>
-          </p:cNvPr>
-          <p:cNvPicPr>
-            <a:picLocks noChangeAspect="1"/>
-          </p:cNvPicPr>
-          <p:nvPr/>
-        </p:nvPicPr>
-        <p:blipFill>
-          <a:blip r:embed="rId5"/>
-          <a:stretch>
-            <a:fillRect/>
-          </a:stretch>
-        </p:blipFill>
-        <p:spPr>
-          <a:xfrm>
-            <a:off x="353262" y="497945"/>
-            <a:ext cx="3112898" cy="2801609"/>
-          </a:xfrm>
-          <a:prstGeom prst="rect">
-            <a:avLst/>
-          </a:prstGeom>
-        </p:spPr>
-      </p:pic>
-      <p:pic>
-        <p:nvPicPr>
-          <p:cNvPr id="7" name="Picture 6">
-            <a:extLst>
-              <a:ext uri="{FF2B5EF4-FFF2-40B4-BE49-F238E27FC236}">
-                <a16:creationId xmlns:a16="http://schemas.microsoft.com/office/drawing/2014/main" id="{0FD3050F-6789-4CE5-A6BB-59153363A9F5}"/>
-              </a:ext>
-            </a:extLst>
-          </p:cNvPr>
-          <p:cNvPicPr>
-            <a:picLocks noChangeAspect="1"/>
-          </p:cNvPicPr>
-          <p:nvPr/>
-        </p:nvPicPr>
-        <p:blipFill>
-          <a:blip r:embed="rId6"/>
-          <a:stretch>
-            <a:fillRect/>
-          </a:stretch>
-        </p:blipFill>
-        <p:spPr>
-          <a:xfrm>
-            <a:off x="353262" y="3837491"/>
-            <a:ext cx="3087794" cy="2801608"/>
-          </a:xfrm>
-          <a:prstGeom prst="rect">
-            <a:avLst/>
-          </a:prstGeom>
-        </p:spPr>
-      </p:pic>
-      <p:sp>
-        <p:nvSpPr>
-          <p:cNvPr id="12" name="&quot;Not Allowed&quot; Symbol 11">
-            <a:extLst>
-              <a:ext uri="{FF2B5EF4-FFF2-40B4-BE49-F238E27FC236}">
-                <a16:creationId xmlns:a16="http://schemas.microsoft.com/office/drawing/2014/main" id="{97002506-AE17-40A0-AC1E-8AA685604C46}"/>
-              </a:ext>
-            </a:extLst>
-          </p:cNvPr>
-          <p:cNvSpPr/>
-          <p:nvPr/>
-        </p:nvSpPr>
-        <p:spPr>
-          <a:xfrm>
-            <a:off x="11025448" y="2417081"/>
-            <a:ext cx="813290" cy="725976"/>
-          </a:xfrm>
-          <a:prstGeom prst="noSmoking">
-            <a:avLst/>
-          </a:prstGeom>
-          <a:solidFill>
-            <a:srgbClr val="FF0000"/>
-          </a:solidFill>
-          <a:ln>
-            <a:solidFill>
-              <a:schemeClr val="tx1"/>
-            </a:solidFill>
-          </a:ln>
-        </p:spPr>
-        <p:style>
-          <a:lnRef idx="2">
-            <a:schemeClr val="accent1">
-              <a:shade val="50000"/>
-            </a:schemeClr>
-          </a:lnRef>
-          <a:fillRef idx="1">
-            <a:schemeClr val="accent1"/>
-          </a:fillRef>
-          <a:effectRef idx="0">
-            <a:schemeClr val="accent1"/>
-          </a:effectRef>
-          <a:fontRef idx="minor">
-            <a:schemeClr val="lt1"/>
-          </a:fontRef>
-        </p:style>
-        <p:txBody>
-          <a:bodyPr rtlCol="0" anchor="ctr"/>
-          <a:lstStyle/>
-          <a:p>
-            <a:pPr algn="ctr"/>
-            <a:endParaRPr lang="pt-BR" dirty="0">
-              <a:solidFill>
-                <a:schemeClr val="tx1"/>
-              </a:solidFill>
-            </a:endParaRPr>
-          </a:p>
-        </p:txBody>
-      </p:sp>
       <p:sp>
         <p:nvSpPr>
           <p:cNvPr id="15" name="Rectangle: Rounded Corners 14">
@@ -5596,7 +5380,7 @@
         </p:nvSpPr>
         <p:spPr>
           <a:xfrm>
-            <a:off x="353262" y="148520"/>
+            <a:off x="386225" y="1328201"/>
             <a:ext cx="453154" cy="276019"/>
           </a:xfrm>
           <a:prstGeom prst="roundRect">
@@ -5636,7 +5420,7 @@
           <a:p>
             <a:pPr algn="ctr"/>
             <a:r>
-              <a:rPr lang="pt-BR" b="1" dirty="0">
+              <a:rPr lang="pt-BR" sz="1600" b="1" dirty="0">
                 <a:solidFill>
                   <a:schemeClr val="bg2">
                     <a:lumMod val="50000"/>
@@ -5662,7 +5446,7 @@
         </p:nvSpPr>
         <p:spPr>
           <a:xfrm>
-            <a:off x="344251" y="3510674"/>
+            <a:off x="4219976" y="1335427"/>
             <a:ext cx="453154" cy="276019"/>
           </a:xfrm>
           <a:prstGeom prst="roundRect">
@@ -5702,7 +5486,7 @@
           <a:p>
             <a:pPr algn="ctr"/>
             <a:r>
-              <a:rPr lang="pt-BR" b="1" dirty="0">
+              <a:rPr lang="pt-BR" sz="1600" b="1" dirty="0">
                 <a:solidFill>
                   <a:schemeClr val="bg2">
                     <a:lumMod val="50000"/>
@@ -5728,8 +5512,8 @@
         </p:nvSpPr>
         <p:spPr>
           <a:xfrm>
-            <a:off x="4618178" y="2279072"/>
-            <a:ext cx="453154" cy="276019"/>
+            <a:off x="8219663" y="1334244"/>
+            <a:ext cx="406206" cy="277202"/>
           </a:xfrm>
           <a:prstGeom prst="roundRect">
             <a:avLst/>
@@ -5768,7 +5552,7 @@
           <a:p>
             <a:pPr algn="ctr"/>
             <a:r>
-              <a:rPr lang="pt-BR" b="1" dirty="0">
+              <a:rPr lang="pt-BR" sz="1600" b="1" dirty="0">
                 <a:solidFill>
                   <a:schemeClr val="bg2">
                     <a:lumMod val="50000"/>
@@ -5794,8 +5578,8 @@
         </p:nvSpPr>
         <p:spPr>
           <a:xfrm>
-            <a:off x="8891780" y="148519"/>
-            <a:ext cx="453154" cy="276019"/>
+            <a:off x="131709" y="3850982"/>
+            <a:ext cx="360200" cy="276019"/>
           </a:xfrm>
           <a:prstGeom prst="roundRect">
             <a:avLst/>
@@ -5834,7 +5618,7 @@
           <a:p>
             <a:pPr algn="ctr"/>
             <a:r>
-              <a:rPr lang="pt-BR" b="1" dirty="0">
+              <a:rPr lang="pt-BR" sz="1200" b="1" dirty="0">
                 <a:solidFill>
                   <a:schemeClr val="bg2">
                     <a:lumMod val="50000"/>
@@ -5843,6 +5627,13 @@
               </a:rPr>
               <a:t>4°</a:t>
             </a:r>
+            <a:endParaRPr lang="pt-BR" sz="1600" b="1" dirty="0">
+              <a:solidFill>
+                <a:schemeClr val="bg2">
+                  <a:lumMod val="50000"/>
+                </a:schemeClr>
+              </a:solidFill>
+            </a:endParaRPr>
           </a:p>
         </p:txBody>
       </p:sp>
@@ -5860,8 +5651,8 @@
         </p:nvSpPr>
         <p:spPr>
           <a:xfrm>
-            <a:off x="8957420" y="3510673"/>
-            <a:ext cx="453154" cy="276019"/>
+            <a:off x="3077743" y="3849154"/>
+            <a:ext cx="359417" cy="276019"/>
           </a:xfrm>
           <a:prstGeom prst="roundRect">
             <a:avLst/>
@@ -5900,7 +5691,7 @@
           <a:p>
             <a:pPr algn="ctr"/>
             <a:r>
-              <a:rPr lang="pt-BR" b="1" dirty="0">
+              <a:rPr lang="pt-BR" sz="1200" b="1" dirty="0">
                 <a:solidFill>
                   <a:schemeClr val="bg2">
                     <a:lumMod val="50000"/>
@@ -5909,15 +5700,244 @@
               </a:rPr>
               <a:t>5°</a:t>
             </a:r>
-          </a:p>
-        </p:txBody>
-      </p:sp>
-      <p:sp>
-        <p:nvSpPr>
-          <p:cNvPr id="16" name="Rectangle: Rounded Corners 15">
+            <a:endParaRPr lang="pt-BR" sz="1600" b="1" dirty="0">
+              <a:solidFill>
+                <a:schemeClr val="bg2">
+                  <a:lumMod val="50000"/>
+                </a:schemeClr>
+              </a:solidFill>
+            </a:endParaRPr>
+          </a:p>
+        </p:txBody>
+      </p:sp>
+      <p:pic>
+        <p:nvPicPr>
+          <p:cNvPr id="3" name="Picture 2">
             <a:extLst>
               <a:ext uri="{FF2B5EF4-FFF2-40B4-BE49-F238E27FC236}">
-                <a16:creationId xmlns:a16="http://schemas.microsoft.com/office/drawing/2014/main" id="{F35F61FC-4EE2-4005-A065-43763DA4BC88}"/>
+                <a16:creationId xmlns:a16="http://schemas.microsoft.com/office/drawing/2014/main" id="{5BA08D3A-3068-40B3-9201-9C982495A627}"/>
+              </a:ext>
+            </a:extLst>
+          </p:cNvPr>
+          <p:cNvPicPr>
+            <a:picLocks noChangeAspect="1"/>
+          </p:cNvPicPr>
+          <p:nvPr/>
+        </p:nvPicPr>
+        <p:blipFill>
+          <a:blip r:embed="rId2"/>
+          <a:stretch>
+            <a:fillRect/>
+          </a:stretch>
+        </p:blipFill>
+        <p:spPr>
+          <a:xfrm>
+            <a:off x="8625869" y="1210012"/>
+            <a:ext cx="2726752" cy="2461923"/>
+          </a:xfrm>
+          <a:prstGeom prst="rect">
+            <a:avLst/>
+          </a:prstGeom>
+          <a:ln w="12700">
+            <a:solidFill>
+              <a:schemeClr val="bg1"/>
+            </a:solidFill>
+          </a:ln>
+        </p:spPr>
+      </p:pic>
+      <p:pic>
+        <p:nvPicPr>
+          <p:cNvPr id="6" name="Picture 5">
+            <a:extLst>
+              <a:ext uri="{FF2B5EF4-FFF2-40B4-BE49-F238E27FC236}">
+                <a16:creationId xmlns:a16="http://schemas.microsoft.com/office/drawing/2014/main" id="{4D498811-4675-4A58-B5EC-078960934C4A}"/>
+              </a:ext>
+            </a:extLst>
+          </p:cNvPr>
+          <p:cNvPicPr>
+            <a:picLocks noChangeAspect="1"/>
+          </p:cNvPicPr>
+          <p:nvPr/>
+        </p:nvPicPr>
+        <p:blipFill>
+          <a:blip r:embed="rId3"/>
+          <a:stretch>
+            <a:fillRect/>
+          </a:stretch>
+        </p:blipFill>
+        <p:spPr>
+          <a:xfrm>
+            <a:off x="776611" y="1196271"/>
+            <a:ext cx="2749423" cy="2474481"/>
+          </a:xfrm>
+          <a:prstGeom prst="rect">
+            <a:avLst/>
+          </a:prstGeom>
+          <a:ln w="12700">
+            <a:solidFill>
+              <a:schemeClr val="bg1"/>
+            </a:solidFill>
+          </a:ln>
+        </p:spPr>
+      </p:pic>
+      <p:pic>
+        <p:nvPicPr>
+          <p:cNvPr id="8" name="Picture 7">
+            <a:extLst>
+              <a:ext uri="{FF2B5EF4-FFF2-40B4-BE49-F238E27FC236}">
+                <a16:creationId xmlns:a16="http://schemas.microsoft.com/office/drawing/2014/main" id="{E3EF587B-D6C3-4B49-B5BC-5C844AC12B70}"/>
+              </a:ext>
+            </a:extLst>
+          </p:cNvPr>
+          <p:cNvPicPr>
+            <a:picLocks noChangeAspect="1"/>
+          </p:cNvPicPr>
+          <p:nvPr/>
+        </p:nvPicPr>
+        <p:blipFill>
+          <a:blip r:embed="rId4"/>
+          <a:stretch>
+            <a:fillRect/>
+          </a:stretch>
+        </p:blipFill>
+        <p:spPr>
+          <a:xfrm>
+            <a:off x="4673130" y="1208829"/>
+            <a:ext cx="2748310" cy="2461923"/>
+          </a:xfrm>
+          <a:prstGeom prst="rect">
+            <a:avLst/>
+          </a:prstGeom>
+          <a:ln w="12700">
+            <a:solidFill>
+              <a:schemeClr val="bg1"/>
+            </a:solidFill>
+          </a:ln>
+        </p:spPr>
+      </p:pic>
+      <p:pic>
+        <p:nvPicPr>
+          <p:cNvPr id="10" name="Picture 9">
+            <a:extLst>
+              <a:ext uri="{FF2B5EF4-FFF2-40B4-BE49-F238E27FC236}">
+                <a16:creationId xmlns:a16="http://schemas.microsoft.com/office/drawing/2014/main" id="{8FB8BE25-9824-4D9A-A8DE-B4FEE78C8712}"/>
+              </a:ext>
+            </a:extLst>
+          </p:cNvPr>
+          <p:cNvPicPr>
+            <a:picLocks noChangeAspect="1"/>
+          </p:cNvPicPr>
+          <p:nvPr/>
+        </p:nvPicPr>
+        <p:blipFill>
+          <a:blip r:embed="rId5"/>
+          <a:stretch>
+            <a:fillRect/>
+          </a:stretch>
+        </p:blipFill>
+        <p:spPr>
+          <a:xfrm>
+            <a:off x="131709" y="4124299"/>
+            <a:ext cx="2746830" cy="2475008"/>
+          </a:xfrm>
+          <a:prstGeom prst="rect">
+            <a:avLst/>
+          </a:prstGeom>
+          <a:ln w="12700">
+            <a:solidFill>
+              <a:schemeClr val="bg1"/>
+            </a:solidFill>
+          </a:ln>
+        </p:spPr>
+      </p:pic>
+      <p:pic>
+        <p:nvPicPr>
+          <p:cNvPr id="2050" name="Picture 2">
+            <a:extLst>
+              <a:ext uri="{FF2B5EF4-FFF2-40B4-BE49-F238E27FC236}">
+                <a16:creationId xmlns:a16="http://schemas.microsoft.com/office/drawing/2014/main" id="{5A2558DD-BC81-4C73-81AD-17A39D56AD44}"/>
+              </a:ext>
+            </a:extLst>
+          </p:cNvPr>
+          <p:cNvPicPr>
+            <a:picLocks noChangeAspect="1" noChangeArrowheads="1"/>
+          </p:cNvPicPr>
+          <p:nvPr/>
+        </p:nvPicPr>
+        <p:blipFill>
+          <a:blip r:embed="rId6">
+            <a:extLst>
+              <a:ext uri="{28A0092B-C50C-407E-A947-70E740481C1C}">
+                <a14:useLocalDpi xmlns:a14="http://schemas.microsoft.com/office/drawing/2010/main" val="0"/>
+              </a:ext>
+            </a:extLst>
+          </a:blip>
+          <a:srcRect/>
+          <a:stretch>
+            <a:fillRect/>
+          </a:stretch>
+        </p:blipFill>
+        <p:spPr bwMode="auto">
+          <a:xfrm>
+            <a:off x="-35047" y="11985"/>
+            <a:ext cx="1432894" cy="867519"/>
+          </a:xfrm>
+          <a:prstGeom prst="rect">
+            <a:avLst/>
+          </a:prstGeom>
+          <a:noFill/>
+          <a:extLst>
+            <a:ext uri="{909E8E84-426E-40DD-AFC4-6F175D3DCCD1}">
+              <a14:hiddenFill xmlns:a14="http://schemas.microsoft.com/office/drawing/2010/main">
+                <a:solidFill>
+                  <a:srgbClr val="FFFFFF"/>
+                </a:solidFill>
+              </a14:hiddenFill>
+            </a:ext>
+          </a:extLst>
+        </p:spPr>
+      </p:pic>
+      <p:pic>
+        <p:nvPicPr>
+          <p:cNvPr id="12" name="Picture 11">
+            <a:extLst>
+              <a:ext uri="{FF2B5EF4-FFF2-40B4-BE49-F238E27FC236}">
+                <a16:creationId xmlns:a16="http://schemas.microsoft.com/office/drawing/2014/main" id="{CF95EA50-CB07-43A1-808B-DE897B293648}"/>
+              </a:ext>
+            </a:extLst>
+          </p:cNvPr>
+          <p:cNvPicPr>
+            <a:picLocks noChangeAspect="1"/>
+          </p:cNvPicPr>
+          <p:nvPr/>
+        </p:nvPicPr>
+        <p:blipFill>
+          <a:blip r:embed="rId7"/>
+          <a:stretch>
+            <a:fillRect/>
+          </a:stretch>
+        </p:blipFill>
+        <p:spPr>
+          <a:xfrm>
+            <a:off x="3077600" y="4124298"/>
+            <a:ext cx="2811668" cy="2479105"/>
+          </a:xfrm>
+          <a:prstGeom prst="rect">
+            <a:avLst/>
+          </a:prstGeom>
+          <a:ln w="12700">
+            <a:solidFill>
+              <a:schemeClr val="bg1"/>
+            </a:solidFill>
+          </a:ln>
+        </p:spPr>
+      </p:pic>
+      <p:sp>
+        <p:nvSpPr>
+          <p:cNvPr id="25" name="Rectangle: Rounded Corners 24">
+            <a:extLst>
+              <a:ext uri="{FF2B5EF4-FFF2-40B4-BE49-F238E27FC236}">
+                <a16:creationId xmlns:a16="http://schemas.microsoft.com/office/drawing/2014/main" id="{4706B513-4654-47CA-99AE-037954277E42}"/>
               </a:ext>
             </a:extLst>
           </p:cNvPr>
@@ -5926,13 +5946,19 @@
         </p:nvSpPr>
         <p:spPr>
           <a:xfrm>
-            <a:off x="3864913" y="148519"/>
-            <a:ext cx="4562475" cy="775759"/>
+            <a:off x="6093589" y="3849154"/>
+            <a:ext cx="359417" cy="302321"/>
           </a:xfrm>
           <a:prstGeom prst="roundRect">
             <a:avLst/>
           </a:prstGeom>
-          <a:ln w="28575">
+          <a:solidFill>
+            <a:schemeClr val="accent4">
+              <a:lumMod val="40000"/>
+              <a:lumOff val="60000"/>
+            </a:schemeClr>
+          </a:solidFill>
+          <a:ln w="19050">
             <a:solidFill>
               <a:schemeClr val="tx1"/>
             </a:solidFill>
@@ -5960,24 +5986,269 @@
           <a:p>
             <a:pPr algn="ctr"/>
             <a:r>
+              <a:rPr lang="pt-BR" sz="1200" b="1" dirty="0">
+                <a:solidFill>
+                  <a:schemeClr val="bg2">
+                    <a:lumMod val="50000"/>
+                  </a:schemeClr>
+                </a:solidFill>
+              </a:rPr>
+              <a:t>6°</a:t>
+            </a:r>
+            <a:endParaRPr lang="pt-BR" sz="1400" b="1" dirty="0">
+              <a:solidFill>
+                <a:schemeClr val="bg2">
+                  <a:lumMod val="50000"/>
+                </a:schemeClr>
+              </a:solidFill>
+            </a:endParaRPr>
+          </a:p>
+        </p:txBody>
+      </p:sp>
+      <p:pic>
+        <p:nvPicPr>
+          <p:cNvPr id="17" name="Picture 16">
+            <a:extLst>
+              <a:ext uri="{FF2B5EF4-FFF2-40B4-BE49-F238E27FC236}">
+                <a16:creationId xmlns:a16="http://schemas.microsoft.com/office/drawing/2014/main" id="{035D3B62-EC94-4A38-BB9F-027059390197}"/>
+              </a:ext>
+            </a:extLst>
+          </p:cNvPr>
+          <p:cNvPicPr>
+            <a:picLocks noChangeAspect="1"/>
+          </p:cNvPicPr>
+          <p:nvPr/>
+        </p:nvPicPr>
+        <p:blipFill>
+          <a:blip r:embed="rId8"/>
+          <a:stretch>
+            <a:fillRect/>
+          </a:stretch>
+        </p:blipFill>
+        <p:spPr>
+          <a:xfrm>
+            <a:off x="6088329" y="4109103"/>
+            <a:ext cx="2811668" cy="2474672"/>
+          </a:xfrm>
+          <a:prstGeom prst="rect">
+            <a:avLst/>
+          </a:prstGeom>
+          <a:ln w="12700">
+            <a:solidFill>
+              <a:schemeClr val="bg1"/>
+            </a:solidFill>
+          </a:ln>
+        </p:spPr>
+      </p:pic>
+      <p:sp>
+        <p:nvSpPr>
+          <p:cNvPr id="28" name="Rectangle: Rounded Corners 27">
+            <a:extLst>
+              <a:ext uri="{FF2B5EF4-FFF2-40B4-BE49-F238E27FC236}">
+                <a16:creationId xmlns:a16="http://schemas.microsoft.com/office/drawing/2014/main" id="{78D74EEE-8BBE-47F4-8B60-7C8AAA36645A}"/>
+              </a:ext>
+            </a:extLst>
+          </p:cNvPr>
+          <p:cNvSpPr/>
+          <p:nvPr/>
+        </p:nvSpPr>
+        <p:spPr>
+          <a:xfrm>
+            <a:off x="9109244" y="3822852"/>
+            <a:ext cx="359417" cy="302321"/>
+          </a:xfrm>
+          <a:prstGeom prst="roundRect">
+            <a:avLst/>
+          </a:prstGeom>
+          <a:solidFill>
+            <a:schemeClr val="accent4">
+              <a:lumMod val="40000"/>
+              <a:lumOff val="60000"/>
+            </a:schemeClr>
+          </a:solidFill>
+          <a:ln w="19050">
+            <a:solidFill>
+              <a:schemeClr val="tx1"/>
+            </a:solidFill>
+          </a:ln>
+        </p:spPr>
+        <p:style>
+          <a:lnRef idx="2">
+            <a:schemeClr val="accent1">
+              <a:shade val="50000"/>
+            </a:schemeClr>
+          </a:lnRef>
+          <a:fillRef idx="1">
+            <a:schemeClr val="accent1"/>
+          </a:fillRef>
+          <a:effectRef idx="0">
+            <a:schemeClr val="accent1"/>
+          </a:effectRef>
+          <a:fontRef idx="minor">
+            <a:schemeClr val="lt1"/>
+          </a:fontRef>
+        </p:style>
+        <p:txBody>
+          <a:bodyPr rtlCol="0" anchor="ctr"/>
+          <a:lstStyle/>
+          <a:p>
+            <a:pPr algn="ctr"/>
+            <a:r>
+              <a:rPr lang="pt-BR" sz="1200" b="1" dirty="0">
+                <a:solidFill>
+                  <a:schemeClr val="bg2">
+                    <a:lumMod val="50000"/>
+                  </a:schemeClr>
+                </a:solidFill>
+              </a:rPr>
+              <a:t>7°</a:t>
+            </a:r>
+            <a:endParaRPr lang="pt-BR" sz="1400" b="1" dirty="0">
+              <a:solidFill>
+                <a:schemeClr val="bg2">
+                  <a:lumMod val="50000"/>
+                </a:schemeClr>
+              </a:solidFill>
+            </a:endParaRPr>
+          </a:p>
+        </p:txBody>
+      </p:sp>
+      <p:pic>
+        <p:nvPicPr>
+          <p:cNvPr id="19" name="Picture 18">
+            <a:extLst>
+              <a:ext uri="{FF2B5EF4-FFF2-40B4-BE49-F238E27FC236}">
+                <a16:creationId xmlns:a16="http://schemas.microsoft.com/office/drawing/2014/main" id="{28AB2140-C6C7-4747-9D27-8EEB7A930512}"/>
+              </a:ext>
+            </a:extLst>
+          </p:cNvPr>
+          <p:cNvPicPr>
+            <a:picLocks noChangeAspect="1"/>
+          </p:cNvPicPr>
+          <p:nvPr/>
+        </p:nvPicPr>
+        <p:blipFill>
+          <a:blip r:embed="rId9"/>
+          <a:stretch>
+            <a:fillRect/>
+          </a:stretch>
+        </p:blipFill>
+        <p:spPr>
+          <a:xfrm>
+            <a:off x="9109244" y="4104945"/>
+            <a:ext cx="2742113" cy="2478830"/>
+          </a:xfrm>
+          <a:prstGeom prst="rect">
+            <a:avLst/>
+          </a:prstGeom>
+          <a:ln w="12700">
+            <a:solidFill>
+              <a:schemeClr val="bg1"/>
+            </a:solidFill>
+          </a:ln>
+        </p:spPr>
+      </p:pic>
+      <p:sp>
+        <p:nvSpPr>
+          <p:cNvPr id="20" name="Rectangle: Rounded Corners 19">
+            <a:extLst>
+              <a:ext uri="{FF2B5EF4-FFF2-40B4-BE49-F238E27FC236}">
+                <a16:creationId xmlns:a16="http://schemas.microsoft.com/office/drawing/2014/main" id="{D0C2A248-0DA4-4234-BA66-CF639085D2EA}"/>
+              </a:ext>
+            </a:extLst>
+          </p:cNvPr>
+          <p:cNvSpPr/>
+          <p:nvPr/>
+        </p:nvSpPr>
+        <p:spPr>
+          <a:xfrm>
+            <a:off x="4155598" y="174661"/>
+            <a:ext cx="4405893" cy="577918"/>
+          </a:xfrm>
+          <a:prstGeom prst="roundRect">
+            <a:avLst/>
+          </a:prstGeom>
+          <a:solidFill>
+            <a:srgbClr val="FFFF66"/>
+          </a:solidFill>
+          <a:ln>
+            <a:solidFill>
+              <a:schemeClr val="bg1"/>
+            </a:solidFill>
+          </a:ln>
+        </p:spPr>
+        <p:style>
+          <a:lnRef idx="2">
+            <a:schemeClr val="accent1">
+              <a:shade val="50000"/>
+            </a:schemeClr>
+          </a:lnRef>
+          <a:fillRef idx="1">
+            <a:schemeClr val="accent1"/>
+          </a:fillRef>
+          <a:effectRef idx="0">
+            <a:schemeClr val="accent1"/>
+          </a:effectRef>
+          <a:fontRef idx="minor">
+            <a:schemeClr val="lt1"/>
+          </a:fontRef>
+        </p:style>
+        <p:txBody>
+          <a:bodyPr rtlCol="0" anchor="ctr"/>
+          <a:lstStyle/>
+          <a:p>
+            <a:pPr algn="ctr"/>
+            <a:r>
               <a:rPr lang="pt-BR" sz="2400" b="1" dirty="0">
                 <a:solidFill>
-                  <a:schemeClr val="tx1">
-                    <a:lumMod val="85000"/>
-                  </a:schemeClr>
-                </a:solidFill>
-                <a:latin typeface="Aharoni" panose="02010803020104030203" pitchFamily="2" charset="-79"/>
-                <a:cs typeface="Aharoni" panose="02010803020104030203" pitchFamily="2" charset="-79"/>
+                  <a:schemeClr val="bg1"/>
+                </a:solidFill>
               </a:rPr>
-              <a:t>StoryBoard – As Is TotemHub</a:t>
-            </a:r>
-          </a:p>
-        </p:txBody>
-      </p:sp>
+              <a:t>StoryBoard - TotemHub</a:t>
+            </a:r>
+          </a:p>
+        </p:txBody>
+      </p:sp>
+      <p:pic>
+        <p:nvPicPr>
+          <p:cNvPr id="22" name="Picture 21" descr="Text&#10;&#10;Description automatically generated">
+            <a:extLst>
+              <a:ext uri="{FF2B5EF4-FFF2-40B4-BE49-F238E27FC236}">
+                <a16:creationId xmlns:a16="http://schemas.microsoft.com/office/drawing/2014/main" id="{15C4B8F0-3DCB-4F88-AB22-8C63F020611B}"/>
+              </a:ext>
+            </a:extLst>
+          </p:cNvPr>
+          <p:cNvPicPr>
+            <a:picLocks noChangeAspect="1"/>
+          </p:cNvPicPr>
+          <p:nvPr/>
+        </p:nvPicPr>
+        <p:blipFill>
+          <a:blip r:embed="rId10">
+            <a:extLst>
+              <a:ext uri="{28A0092B-C50C-407E-A947-70E740481C1C}">
+                <a14:useLocalDpi xmlns:a14="http://schemas.microsoft.com/office/drawing/2010/main" val="0"/>
+              </a:ext>
+            </a:extLst>
+          </a:blip>
+          <a:stretch>
+            <a:fillRect/>
+          </a:stretch>
+        </p:blipFill>
+        <p:spPr>
+          <a:xfrm>
+            <a:off x="10297075" y="4526311"/>
+            <a:ext cx="771655" cy="467184"/>
+          </a:xfrm>
+          <a:prstGeom prst="rect">
+            <a:avLst/>
+          </a:prstGeom>
+        </p:spPr>
+      </p:pic>
     </p:spTree>
     <p:extLst>
       <p:ext uri="{BB962C8B-B14F-4D97-AF65-F5344CB8AC3E}">
-        <p14:creationId xmlns:p14="http://schemas.microsoft.com/office/powerpoint/2010/main" val="2301798656"/>
+        <p14:creationId xmlns:p14="http://schemas.microsoft.com/office/powerpoint/2010/main" val="2707052447"/>
       </p:ext>
     </p:extLst>
   </p:cSld>
@@ -6018,7 +6289,7 @@
                                           </p:stCondLst>
                                         </p:cTn>
                                         <p:tgtEl>
-                                          <p:spTgt spid="16"/>
+                                          <p:spTgt spid="15"/>
                                         </p:tgtEl>
                                         <p:attrNameLst>
                                           <p:attrName>style.visibility</p:attrName>
@@ -6032,7 +6303,7 @@
                                       <p:cBhvr additive="base">
                                         <p:cTn id="7" dur="500" fill="hold"/>
                                         <p:tgtEl>
-                                          <p:spTgt spid="16"/>
+                                          <p:spTgt spid="15"/>
                                         </p:tgtEl>
                                         <p:attrNameLst>
                                           <p:attrName>ppt_x</p:attrName>
@@ -6055,7 +6326,7 @@
                                       <p:cBhvr additive="base">
                                         <p:cTn id="8" dur="500" fill="hold"/>
                                         <p:tgtEl>
-                                          <p:spTgt spid="16"/>
+                                          <p:spTgt spid="15"/>
                                         </p:tgtEl>
                                         <p:attrNameLst>
                                           <p:attrName>ppt_y</p:attrName>
@@ -6109,7 +6380,7 @@
                                           </p:stCondLst>
                                         </p:cTn>
                                         <p:tgtEl>
-                                          <p:spTgt spid="15"/>
+                                          <p:spTgt spid="37"/>
                                         </p:tgtEl>
                                         <p:attrNameLst>
                                           <p:attrName>style.visibility</p:attrName>
@@ -6123,7 +6394,7 @@
                                       <p:cBhvr additive="base">
                                         <p:cTn id="13" dur="500" fill="hold"/>
                                         <p:tgtEl>
-                                          <p:spTgt spid="15"/>
+                                          <p:spTgt spid="37"/>
                                         </p:tgtEl>
                                         <p:attrNameLst>
                                           <p:attrName>ppt_x</p:attrName>
@@ -6146,7 +6417,7 @@
                                       <p:cBhvr additive="base">
                                         <p:cTn id="14" dur="500" fill="hold"/>
                                         <p:tgtEl>
-                                          <p:spTgt spid="15"/>
+                                          <p:spTgt spid="37"/>
                                         </p:tgtEl>
                                         <p:attrNameLst>
                                           <p:attrName>ppt_y</p:attrName>
@@ -6187,7 +6458,7 @@
                             </p:stCondLst>
                             <p:childTnLst>
                               <p:par>
-                                <p:cTn id="17" presetID="2" presetClass="entr" presetSubtype="4" fill="hold" nodeType="clickEffect">
+                                <p:cTn id="17" presetID="2" presetClass="entr" presetSubtype="4" fill="hold" grpId="0" nodeType="clickEffect">
                                   <p:stCondLst>
                                     <p:cond delay="0"/>
                                   </p:stCondLst>
@@ -6200,7 +6471,7 @@
                                           </p:stCondLst>
                                         </p:cTn>
                                         <p:tgtEl>
-                                          <p:spTgt spid="5"/>
+                                          <p:spTgt spid="38"/>
                                         </p:tgtEl>
                                         <p:attrNameLst>
                                           <p:attrName>style.visibility</p:attrName>
@@ -6214,7 +6485,7 @@
                                       <p:cBhvr additive="base">
                                         <p:cTn id="19" dur="500" fill="hold"/>
                                         <p:tgtEl>
-                                          <p:spTgt spid="5"/>
+                                          <p:spTgt spid="38"/>
                                         </p:tgtEl>
                                         <p:attrNameLst>
                                           <p:attrName>ppt_x</p:attrName>
@@ -6237,7 +6508,7 @@
                                       <p:cBhvr additive="base">
                                         <p:cTn id="20" dur="500" fill="hold"/>
                                         <p:tgtEl>
-                                          <p:spTgt spid="5"/>
+                                          <p:spTgt spid="38"/>
                                         </p:tgtEl>
                                         <p:attrNameLst>
                                           <p:attrName>ppt_y</p:attrName>
@@ -6291,7 +6562,7 @@
                                           </p:stCondLst>
                                         </p:cTn>
                                         <p:tgtEl>
-                                          <p:spTgt spid="37"/>
+                                          <p:spTgt spid="39"/>
                                         </p:tgtEl>
                                         <p:attrNameLst>
                                           <p:attrName>style.visibility</p:attrName>
@@ -6305,7 +6576,7 @@
                                       <p:cBhvr additive="base">
                                         <p:cTn id="25" dur="500" fill="hold"/>
                                         <p:tgtEl>
-                                          <p:spTgt spid="37"/>
+                                          <p:spTgt spid="39"/>
                                         </p:tgtEl>
                                         <p:attrNameLst>
                                           <p:attrName>ppt_x</p:attrName>
@@ -6328,7 +6599,7 @@
                                       <p:cBhvr additive="base">
                                         <p:cTn id="26" dur="500" fill="hold"/>
                                         <p:tgtEl>
-                                          <p:spTgt spid="37"/>
+                                          <p:spTgt spid="39"/>
                                         </p:tgtEl>
                                         <p:attrNameLst>
                                           <p:attrName>ppt_y</p:attrName>
@@ -6369,7 +6640,7 @@
                             </p:stCondLst>
                             <p:childTnLst>
                               <p:par>
-                                <p:cTn id="29" presetID="2" presetClass="entr" presetSubtype="4" fill="hold" nodeType="clickEffect">
+                                <p:cTn id="29" presetID="2" presetClass="entr" presetSubtype="4" fill="hold" grpId="0" nodeType="clickEffect">
                                   <p:stCondLst>
                                     <p:cond delay="0"/>
                                   </p:stCondLst>
@@ -6382,7 +6653,7 @@
                                           </p:stCondLst>
                                         </p:cTn>
                                         <p:tgtEl>
-                                          <p:spTgt spid="7"/>
+                                          <p:spTgt spid="40"/>
                                         </p:tgtEl>
                                         <p:attrNameLst>
                                           <p:attrName>style.visibility</p:attrName>
@@ -6396,7 +6667,7 @@
                                       <p:cBhvr additive="base">
                                         <p:cTn id="31" dur="500" fill="hold"/>
                                         <p:tgtEl>
-                                          <p:spTgt spid="7"/>
+                                          <p:spTgt spid="40"/>
                                         </p:tgtEl>
                                         <p:attrNameLst>
                                           <p:attrName>ppt_x</p:attrName>
@@ -6419,7 +6690,7 @@
                                       <p:cBhvr additive="base">
                                         <p:cTn id="32" dur="500" fill="hold"/>
                                         <p:tgtEl>
-                                          <p:spTgt spid="7"/>
+                                          <p:spTgt spid="40"/>
                                         </p:tgtEl>
                                         <p:attrNameLst>
                                           <p:attrName>ppt_y</p:attrName>
@@ -6473,7 +6744,7 @@
                                           </p:stCondLst>
                                         </p:cTn>
                                         <p:tgtEl>
-                                          <p:spTgt spid="38"/>
+                                          <p:spTgt spid="25"/>
                                         </p:tgtEl>
                                         <p:attrNameLst>
                                           <p:attrName>style.visibility</p:attrName>
@@ -6487,7 +6758,7 @@
                                       <p:cBhvr additive="base">
                                         <p:cTn id="37" dur="500" fill="hold"/>
                                         <p:tgtEl>
-                                          <p:spTgt spid="38"/>
+                                          <p:spTgt spid="25"/>
                                         </p:tgtEl>
                                         <p:attrNameLst>
                                           <p:attrName>ppt_x</p:attrName>
@@ -6510,7 +6781,7 @@
                                       <p:cBhvr additive="base">
                                         <p:cTn id="38" dur="500" fill="hold"/>
                                         <p:tgtEl>
-                                          <p:spTgt spid="38"/>
+                                          <p:spTgt spid="25"/>
                                         </p:tgtEl>
                                         <p:attrNameLst>
                                           <p:attrName>ppt_y</p:attrName>
@@ -6551,7 +6822,7 @@
                             </p:stCondLst>
                             <p:childTnLst>
                               <p:par>
-                                <p:cTn id="41" presetID="2" presetClass="entr" presetSubtype="4" fill="hold" nodeType="clickEffect">
+                                <p:cTn id="41" presetID="2" presetClass="entr" presetSubtype="4" fill="hold" grpId="0" nodeType="clickEffect">
                                   <p:stCondLst>
                                     <p:cond delay="0"/>
                                   </p:stCondLst>
@@ -6564,7 +6835,7 @@
                                           </p:stCondLst>
                                         </p:cTn>
                                         <p:tgtEl>
-                                          <p:spTgt spid="9"/>
+                                          <p:spTgt spid="28"/>
                                         </p:tgtEl>
                                         <p:attrNameLst>
                                           <p:attrName>style.visibility</p:attrName>
@@ -6578,7 +6849,7 @@
                                       <p:cBhvr additive="base">
                                         <p:cTn id="43" dur="500" fill="hold"/>
                                         <p:tgtEl>
-                                          <p:spTgt spid="9"/>
+                                          <p:spTgt spid="28"/>
                                         </p:tgtEl>
                                         <p:attrNameLst>
                                           <p:attrName>ppt_x</p:attrName>
@@ -6601,462 +6872,7 @@
                                       <p:cBhvr additive="base">
                                         <p:cTn id="44" dur="500" fill="hold"/>
                                         <p:tgtEl>
-                                          <p:spTgt spid="9"/>
-                                        </p:tgtEl>
-                                        <p:attrNameLst>
-                                          <p:attrName>ppt_y</p:attrName>
-                                        </p:attrNameLst>
-                                      </p:cBhvr>
-                                      <p:tavLst>
-                                        <p:tav tm="0">
-                                          <p:val>
-                                            <p:strVal val="1+#ppt_h/2"/>
-                                          </p:val>
-                                        </p:tav>
-                                        <p:tav tm="100000">
-                                          <p:val>
-                                            <p:strVal val="#ppt_y"/>
-                                          </p:val>
-                                        </p:tav>
-                                      </p:tavLst>
-                                    </p:anim>
-                                  </p:childTnLst>
-                                </p:cTn>
-                              </p:par>
-                            </p:childTnLst>
-                          </p:cTn>
-                        </p:par>
-                      </p:childTnLst>
-                    </p:cTn>
-                  </p:par>
-                  <p:par>
-                    <p:cTn id="45" fill="hold">
-                      <p:stCondLst>
-                        <p:cond delay="indefinite"/>
-                      </p:stCondLst>
-                      <p:childTnLst>
-                        <p:par>
-                          <p:cTn id="46" fill="hold">
-                            <p:stCondLst>
-                              <p:cond delay="0"/>
-                            </p:stCondLst>
-                            <p:childTnLst>
-                              <p:par>
-                                <p:cTn id="47" presetID="2" presetClass="entr" presetSubtype="4" fill="hold" grpId="0" nodeType="clickEffect">
-                                  <p:stCondLst>
-                                    <p:cond delay="0"/>
-                                  </p:stCondLst>
-                                  <p:childTnLst>
-                                    <p:set>
-                                      <p:cBhvr>
-                                        <p:cTn id="48" dur="1" fill="hold">
-                                          <p:stCondLst>
-                                            <p:cond delay="0"/>
-                                          </p:stCondLst>
-                                        </p:cTn>
-                                        <p:tgtEl>
-                                          <p:spTgt spid="39"/>
-                                        </p:tgtEl>
-                                        <p:attrNameLst>
-                                          <p:attrName>style.visibility</p:attrName>
-                                        </p:attrNameLst>
-                                      </p:cBhvr>
-                                      <p:to>
-                                        <p:strVal val="visible"/>
-                                      </p:to>
-                                    </p:set>
-                                    <p:anim calcmode="lin" valueType="num">
-                                      <p:cBhvr additive="base">
-                                        <p:cTn id="49" dur="500" fill="hold"/>
-                                        <p:tgtEl>
-                                          <p:spTgt spid="39"/>
-                                        </p:tgtEl>
-                                        <p:attrNameLst>
-                                          <p:attrName>ppt_x</p:attrName>
-                                        </p:attrNameLst>
-                                      </p:cBhvr>
-                                      <p:tavLst>
-                                        <p:tav tm="0">
-                                          <p:val>
-                                            <p:strVal val="#ppt_x"/>
-                                          </p:val>
-                                        </p:tav>
-                                        <p:tav tm="100000">
-                                          <p:val>
-                                            <p:strVal val="#ppt_x"/>
-                                          </p:val>
-                                        </p:tav>
-                                      </p:tavLst>
-                                    </p:anim>
-                                    <p:anim calcmode="lin" valueType="num">
-                                      <p:cBhvr additive="base">
-                                        <p:cTn id="50" dur="500" fill="hold"/>
-                                        <p:tgtEl>
-                                          <p:spTgt spid="39"/>
-                                        </p:tgtEl>
-                                        <p:attrNameLst>
-                                          <p:attrName>ppt_y</p:attrName>
-                                        </p:attrNameLst>
-                                      </p:cBhvr>
-                                      <p:tavLst>
-                                        <p:tav tm="0">
-                                          <p:val>
-                                            <p:strVal val="1+#ppt_h/2"/>
-                                          </p:val>
-                                        </p:tav>
-                                        <p:tav tm="100000">
-                                          <p:val>
-                                            <p:strVal val="#ppt_y"/>
-                                          </p:val>
-                                        </p:tav>
-                                      </p:tavLst>
-                                    </p:anim>
-                                  </p:childTnLst>
-                                </p:cTn>
-                              </p:par>
-                            </p:childTnLst>
-                          </p:cTn>
-                        </p:par>
-                      </p:childTnLst>
-                    </p:cTn>
-                  </p:par>
-                  <p:par>
-                    <p:cTn id="51" fill="hold">
-                      <p:stCondLst>
-                        <p:cond delay="indefinite"/>
-                      </p:stCondLst>
-                      <p:childTnLst>
-                        <p:par>
-                          <p:cTn id="52" fill="hold">
-                            <p:stCondLst>
-                              <p:cond delay="0"/>
-                            </p:stCondLst>
-                            <p:childTnLst>
-                              <p:par>
-                                <p:cTn id="53" presetID="2" presetClass="entr" presetSubtype="4" fill="hold" nodeType="clickEffect">
-                                  <p:stCondLst>
-                                    <p:cond delay="0"/>
-                                  </p:stCondLst>
-                                  <p:childTnLst>
-                                    <p:set>
-                                      <p:cBhvr>
-                                        <p:cTn id="54" dur="1" fill="hold">
-                                          <p:stCondLst>
-                                            <p:cond delay="0"/>
-                                          </p:stCondLst>
-                                        </p:cTn>
-                                        <p:tgtEl>
-                                          <p:spTgt spid="11"/>
-                                        </p:tgtEl>
-                                        <p:attrNameLst>
-                                          <p:attrName>style.visibility</p:attrName>
-                                        </p:attrNameLst>
-                                      </p:cBhvr>
-                                      <p:to>
-                                        <p:strVal val="visible"/>
-                                      </p:to>
-                                    </p:set>
-                                    <p:anim calcmode="lin" valueType="num">
-                                      <p:cBhvr additive="base">
-                                        <p:cTn id="55" dur="500" fill="hold"/>
-                                        <p:tgtEl>
-                                          <p:spTgt spid="11"/>
-                                        </p:tgtEl>
-                                        <p:attrNameLst>
-                                          <p:attrName>ppt_x</p:attrName>
-                                        </p:attrNameLst>
-                                      </p:cBhvr>
-                                      <p:tavLst>
-                                        <p:tav tm="0">
-                                          <p:val>
-                                            <p:strVal val="#ppt_x"/>
-                                          </p:val>
-                                        </p:tav>
-                                        <p:tav tm="100000">
-                                          <p:val>
-                                            <p:strVal val="#ppt_x"/>
-                                          </p:val>
-                                        </p:tav>
-                                      </p:tavLst>
-                                    </p:anim>
-                                    <p:anim calcmode="lin" valueType="num">
-                                      <p:cBhvr additive="base">
-                                        <p:cTn id="56" dur="500" fill="hold"/>
-                                        <p:tgtEl>
-                                          <p:spTgt spid="11"/>
-                                        </p:tgtEl>
-                                        <p:attrNameLst>
-                                          <p:attrName>ppt_y</p:attrName>
-                                        </p:attrNameLst>
-                                      </p:cBhvr>
-                                      <p:tavLst>
-                                        <p:tav tm="0">
-                                          <p:val>
-                                            <p:strVal val="1+#ppt_h/2"/>
-                                          </p:val>
-                                        </p:tav>
-                                        <p:tav tm="100000">
-                                          <p:val>
-                                            <p:strVal val="#ppt_y"/>
-                                          </p:val>
-                                        </p:tav>
-                                      </p:tavLst>
-                                    </p:anim>
-                                  </p:childTnLst>
-                                </p:cTn>
-                              </p:par>
-                            </p:childTnLst>
-                          </p:cTn>
-                        </p:par>
-                      </p:childTnLst>
-                    </p:cTn>
-                  </p:par>
-                  <p:par>
-                    <p:cTn id="57" fill="hold">
-                      <p:stCondLst>
-                        <p:cond delay="indefinite"/>
-                      </p:stCondLst>
-                      <p:childTnLst>
-                        <p:par>
-                          <p:cTn id="58" fill="hold">
-                            <p:stCondLst>
-                              <p:cond delay="0"/>
-                            </p:stCondLst>
-                            <p:childTnLst>
-                              <p:par>
-                                <p:cTn id="59" presetID="2" presetClass="entr" presetSubtype="4" fill="hold" grpId="0" nodeType="clickEffect">
-                                  <p:stCondLst>
-                                    <p:cond delay="0"/>
-                                  </p:stCondLst>
-                                  <p:childTnLst>
-                                    <p:set>
-                                      <p:cBhvr>
-                                        <p:cTn id="60" dur="1" fill="hold">
-                                          <p:stCondLst>
-                                            <p:cond delay="0"/>
-                                          </p:stCondLst>
-                                        </p:cTn>
-                                        <p:tgtEl>
-                                          <p:spTgt spid="12"/>
-                                        </p:tgtEl>
-                                        <p:attrNameLst>
-                                          <p:attrName>style.visibility</p:attrName>
-                                        </p:attrNameLst>
-                                      </p:cBhvr>
-                                      <p:to>
-                                        <p:strVal val="visible"/>
-                                      </p:to>
-                                    </p:set>
-                                    <p:anim calcmode="lin" valueType="num">
-                                      <p:cBhvr additive="base">
-                                        <p:cTn id="61" dur="500" fill="hold"/>
-                                        <p:tgtEl>
-                                          <p:spTgt spid="12"/>
-                                        </p:tgtEl>
-                                        <p:attrNameLst>
-                                          <p:attrName>ppt_x</p:attrName>
-                                        </p:attrNameLst>
-                                      </p:cBhvr>
-                                      <p:tavLst>
-                                        <p:tav tm="0">
-                                          <p:val>
-                                            <p:strVal val="#ppt_x"/>
-                                          </p:val>
-                                        </p:tav>
-                                        <p:tav tm="100000">
-                                          <p:val>
-                                            <p:strVal val="#ppt_x"/>
-                                          </p:val>
-                                        </p:tav>
-                                      </p:tavLst>
-                                    </p:anim>
-                                    <p:anim calcmode="lin" valueType="num">
-                                      <p:cBhvr additive="base">
-                                        <p:cTn id="62" dur="500" fill="hold"/>
-                                        <p:tgtEl>
-                                          <p:spTgt spid="12"/>
-                                        </p:tgtEl>
-                                        <p:attrNameLst>
-                                          <p:attrName>ppt_y</p:attrName>
-                                        </p:attrNameLst>
-                                      </p:cBhvr>
-                                      <p:tavLst>
-                                        <p:tav tm="0">
-                                          <p:val>
-                                            <p:strVal val="1+#ppt_h/2"/>
-                                          </p:val>
-                                        </p:tav>
-                                        <p:tav tm="100000">
-                                          <p:val>
-                                            <p:strVal val="#ppt_y"/>
-                                          </p:val>
-                                        </p:tav>
-                                      </p:tavLst>
-                                    </p:anim>
-                                  </p:childTnLst>
-                                </p:cTn>
-                              </p:par>
-                            </p:childTnLst>
-                          </p:cTn>
-                        </p:par>
-                      </p:childTnLst>
-                    </p:cTn>
-                  </p:par>
-                  <p:par>
-                    <p:cTn id="63" fill="hold">
-                      <p:stCondLst>
-                        <p:cond delay="indefinite"/>
-                      </p:stCondLst>
-                      <p:childTnLst>
-                        <p:par>
-                          <p:cTn id="64" fill="hold">
-                            <p:stCondLst>
-                              <p:cond delay="0"/>
-                            </p:stCondLst>
-                            <p:childTnLst>
-                              <p:par>
-                                <p:cTn id="65" presetID="2" presetClass="entr" presetSubtype="4" fill="hold" grpId="0" nodeType="clickEffect">
-                                  <p:stCondLst>
-                                    <p:cond delay="0"/>
-                                  </p:stCondLst>
-                                  <p:childTnLst>
-                                    <p:set>
-                                      <p:cBhvr>
-                                        <p:cTn id="66" dur="1" fill="hold">
-                                          <p:stCondLst>
-                                            <p:cond delay="0"/>
-                                          </p:stCondLst>
-                                        </p:cTn>
-                                        <p:tgtEl>
-                                          <p:spTgt spid="40"/>
-                                        </p:tgtEl>
-                                        <p:attrNameLst>
-                                          <p:attrName>style.visibility</p:attrName>
-                                        </p:attrNameLst>
-                                      </p:cBhvr>
-                                      <p:to>
-                                        <p:strVal val="visible"/>
-                                      </p:to>
-                                    </p:set>
-                                    <p:anim calcmode="lin" valueType="num">
-                                      <p:cBhvr additive="base">
-                                        <p:cTn id="67" dur="500" fill="hold"/>
-                                        <p:tgtEl>
-                                          <p:spTgt spid="40"/>
-                                        </p:tgtEl>
-                                        <p:attrNameLst>
-                                          <p:attrName>ppt_x</p:attrName>
-                                        </p:attrNameLst>
-                                      </p:cBhvr>
-                                      <p:tavLst>
-                                        <p:tav tm="0">
-                                          <p:val>
-                                            <p:strVal val="#ppt_x"/>
-                                          </p:val>
-                                        </p:tav>
-                                        <p:tav tm="100000">
-                                          <p:val>
-                                            <p:strVal val="#ppt_x"/>
-                                          </p:val>
-                                        </p:tav>
-                                      </p:tavLst>
-                                    </p:anim>
-                                    <p:anim calcmode="lin" valueType="num">
-                                      <p:cBhvr additive="base">
-                                        <p:cTn id="68" dur="500" fill="hold"/>
-                                        <p:tgtEl>
-                                          <p:spTgt spid="40"/>
-                                        </p:tgtEl>
-                                        <p:attrNameLst>
-                                          <p:attrName>ppt_y</p:attrName>
-                                        </p:attrNameLst>
-                                      </p:cBhvr>
-                                      <p:tavLst>
-                                        <p:tav tm="0">
-                                          <p:val>
-                                            <p:strVal val="1+#ppt_h/2"/>
-                                          </p:val>
-                                        </p:tav>
-                                        <p:tav tm="100000">
-                                          <p:val>
-                                            <p:strVal val="#ppt_y"/>
-                                          </p:val>
-                                        </p:tav>
-                                      </p:tavLst>
-                                    </p:anim>
-                                  </p:childTnLst>
-                                </p:cTn>
-                              </p:par>
-                            </p:childTnLst>
-                          </p:cTn>
-                        </p:par>
-                      </p:childTnLst>
-                    </p:cTn>
-                  </p:par>
-                  <p:par>
-                    <p:cTn id="69" fill="hold">
-                      <p:stCondLst>
-                        <p:cond delay="indefinite"/>
-                      </p:stCondLst>
-                      <p:childTnLst>
-                        <p:par>
-                          <p:cTn id="70" fill="hold">
-                            <p:stCondLst>
-                              <p:cond delay="0"/>
-                            </p:stCondLst>
-                            <p:childTnLst>
-                              <p:par>
-                                <p:cTn id="71" presetID="2" presetClass="entr" presetSubtype="4" fill="hold" nodeType="clickEffect">
-                                  <p:stCondLst>
-                                    <p:cond delay="0"/>
-                                  </p:stCondLst>
-                                  <p:childTnLst>
-                                    <p:set>
-                                      <p:cBhvr>
-                                        <p:cTn id="72" dur="1" fill="hold">
-                                          <p:stCondLst>
-                                            <p:cond delay="0"/>
-                                          </p:stCondLst>
-                                        </p:cTn>
-                                        <p:tgtEl>
-                                          <p:spTgt spid="14"/>
-                                        </p:tgtEl>
-                                        <p:attrNameLst>
-                                          <p:attrName>style.visibility</p:attrName>
-                                        </p:attrNameLst>
-                                      </p:cBhvr>
-                                      <p:to>
-                                        <p:strVal val="visible"/>
-                                      </p:to>
-                                    </p:set>
-                                    <p:anim calcmode="lin" valueType="num">
-                                      <p:cBhvr additive="base">
-                                        <p:cTn id="73" dur="500" fill="hold"/>
-                                        <p:tgtEl>
-                                          <p:spTgt spid="14"/>
-                                        </p:tgtEl>
-                                        <p:attrNameLst>
-                                          <p:attrName>ppt_x</p:attrName>
-                                        </p:attrNameLst>
-                                      </p:cBhvr>
-                                      <p:tavLst>
-                                        <p:tav tm="0">
-                                          <p:val>
-                                            <p:strVal val="#ppt_x"/>
-                                          </p:val>
-                                        </p:tav>
-                                        <p:tav tm="100000">
-                                          <p:val>
-                                            <p:strVal val="#ppt_x"/>
-                                          </p:val>
-                                        </p:tav>
-                                      </p:tavLst>
-                                    </p:anim>
-                                    <p:anim calcmode="lin" valueType="num">
-                                      <p:cBhvr additive="base">
-                                        <p:cTn id="74" dur="500" fill="hold"/>
-                                        <p:tgtEl>
-                                          <p:spTgt spid="14"/>
+                                          <p:spTgt spid="28"/>
                                         </p:tgtEl>
                                         <p:attrNameLst>
                                           <p:attrName>ppt_y</p:attrName>
@@ -7106,13 +6922,13 @@
       </p:par>
     </p:tnLst>
     <p:bldLst>
-      <p:bldP spid="12" grpId="0" animBg="1"/>
       <p:bldP spid="15" grpId="0" animBg="1"/>
       <p:bldP spid="37" grpId="0" animBg="1"/>
       <p:bldP spid="38" grpId="0" animBg="1"/>
       <p:bldP spid="39" grpId="0" animBg="1"/>
       <p:bldP spid="40" grpId="0" animBg="1"/>
-      <p:bldP spid="16" grpId="0" animBg="1"/>
+      <p:bldP spid="25" grpId="0" animBg="1"/>
+      <p:bldP spid="28" grpId="0" animBg="1"/>
     </p:bldLst>
   </p:timing>
 </p:sld>
@@ -7121,7 +6937,7 @@
 <file path=ppt/theme/theme1.xml><?xml version="1.0" encoding="utf-8"?>
 <a:theme xmlns:a="http://schemas.openxmlformats.org/drawingml/2006/main" name="Slice">
   <a:themeElements>
-    <a:clrScheme name="Slice">
+    <a:clrScheme name="Grayscale">
       <a:dk1>
         <a:sysClr val="windowText" lastClr="000000"/>
       </a:dk1>
@@ -7129,34 +6945,34 @@
         <a:sysClr val="window" lastClr="FFFFFF"/>
       </a:lt1>
       <a:dk2>
-        <a:srgbClr val="146194"/>
+        <a:srgbClr val="000000"/>
       </a:dk2>
       <a:lt2>
-        <a:srgbClr val="76DBF4"/>
+        <a:srgbClr val="F8F8F8"/>
       </a:lt2>
       <a:accent1>
-        <a:srgbClr val="052F61"/>
+        <a:srgbClr val="DDDDDD"/>
       </a:accent1>
       <a:accent2>
-        <a:srgbClr val="A50E82"/>
+        <a:srgbClr val="B2B2B2"/>
       </a:accent2>
       <a:accent3>
-        <a:srgbClr val="14967C"/>
+        <a:srgbClr val="969696"/>
       </a:accent3>
       <a:accent4>
-        <a:srgbClr val="6A9E1F"/>
+        <a:srgbClr val="808080"/>
       </a:accent4>
       <a:accent5>
-        <a:srgbClr val="E87D37"/>
+        <a:srgbClr val="5F5F5F"/>
       </a:accent5>
       <a:accent6>
-        <a:srgbClr val="C62324"/>
+        <a:srgbClr val="4D4D4D"/>
       </a:accent6>
       <a:hlink>
-        <a:srgbClr val="0D2E46"/>
+        <a:srgbClr val="5F5F5F"/>
       </a:hlink>
       <a:folHlink>
-        <a:srgbClr val="356A95"/>
+        <a:srgbClr val="919191"/>
       </a:folHlink>
     </a:clrScheme>
     <a:fontScheme name="Slice">

</xml_diff>